<commit_message>
Updating SI configuration files
</commit_message>
<xml_diff>
--- a/Documents/Smithsonian/v1Andv2Deliverables.pptx
+++ b/Documents/Smithsonian/v1Andv2Deliverables.pptx
@@ -294,7 +294,7 @@
           <a:p>
             <a:fld id="{8A595817-BE18-6842-A002-ABFC911ED6F4}" type="datetimeFigureOut">
               <a:rPr lang="en-US" smtClean="0"/>
-              <a:t>5/15/14</a:t>
+              <a:t>5/22/14</a:t>
             </a:fld>
             <a:endParaRPr lang="en-US"/>
           </a:p>
@@ -464,7 +464,7 @@
           <a:p>
             <a:fld id="{8A595817-BE18-6842-A002-ABFC911ED6F4}" type="datetimeFigureOut">
               <a:rPr lang="en-US" smtClean="0"/>
-              <a:t>5/15/14</a:t>
+              <a:t>5/22/14</a:t>
             </a:fld>
             <a:endParaRPr lang="en-US"/>
           </a:p>
@@ -644,7 +644,7 @@
           <a:p>
             <a:fld id="{8A595817-BE18-6842-A002-ABFC911ED6F4}" type="datetimeFigureOut">
               <a:rPr lang="en-US" smtClean="0"/>
-              <a:t>5/15/14</a:t>
+              <a:t>5/22/14</a:t>
             </a:fld>
             <a:endParaRPr lang="en-US"/>
           </a:p>
@@ -814,7 +814,7 @@
           <a:p>
             <a:fld id="{8A595817-BE18-6842-A002-ABFC911ED6F4}" type="datetimeFigureOut">
               <a:rPr lang="en-US" smtClean="0"/>
-              <a:t>5/15/14</a:t>
+              <a:t>5/22/14</a:t>
             </a:fld>
             <a:endParaRPr lang="en-US"/>
           </a:p>
@@ -1060,7 +1060,7 @@
           <a:p>
             <a:fld id="{8A595817-BE18-6842-A002-ABFC911ED6F4}" type="datetimeFigureOut">
               <a:rPr lang="en-US" smtClean="0"/>
-              <a:t>5/15/14</a:t>
+              <a:t>5/22/14</a:t>
             </a:fld>
             <a:endParaRPr lang="en-US"/>
           </a:p>
@@ -1348,7 +1348,7 @@
           <a:p>
             <a:fld id="{8A595817-BE18-6842-A002-ABFC911ED6F4}" type="datetimeFigureOut">
               <a:rPr lang="en-US" smtClean="0"/>
-              <a:t>5/15/14</a:t>
+              <a:t>5/22/14</a:t>
             </a:fld>
             <a:endParaRPr lang="en-US"/>
           </a:p>
@@ -1770,7 +1770,7 @@
           <a:p>
             <a:fld id="{8A595817-BE18-6842-A002-ABFC911ED6F4}" type="datetimeFigureOut">
               <a:rPr lang="en-US" smtClean="0"/>
-              <a:t>5/15/14</a:t>
+              <a:t>5/22/14</a:t>
             </a:fld>
             <a:endParaRPr lang="en-US"/>
           </a:p>
@@ -1888,7 +1888,7 @@
           <a:p>
             <a:fld id="{8A595817-BE18-6842-A002-ABFC911ED6F4}" type="datetimeFigureOut">
               <a:rPr lang="en-US" smtClean="0"/>
-              <a:t>5/15/14</a:t>
+              <a:t>5/22/14</a:t>
             </a:fld>
             <a:endParaRPr lang="en-US"/>
           </a:p>
@@ -1983,7 +1983,7 @@
           <a:p>
             <a:fld id="{8A595817-BE18-6842-A002-ABFC911ED6F4}" type="datetimeFigureOut">
               <a:rPr lang="en-US" smtClean="0"/>
-              <a:t>5/15/14</a:t>
+              <a:t>5/22/14</a:t>
             </a:fld>
             <a:endParaRPr lang="en-US"/>
           </a:p>
@@ -2260,7 +2260,7 @@
           <a:p>
             <a:fld id="{8A595817-BE18-6842-A002-ABFC911ED6F4}" type="datetimeFigureOut">
               <a:rPr lang="en-US" smtClean="0"/>
-              <a:t>5/15/14</a:t>
+              <a:t>5/22/14</a:t>
             </a:fld>
             <a:endParaRPr lang="en-US"/>
           </a:p>
@@ -2513,7 +2513,7 @@
           <a:p>
             <a:fld id="{8A595817-BE18-6842-A002-ABFC911ED6F4}" type="datetimeFigureOut">
               <a:rPr lang="en-US" smtClean="0"/>
-              <a:t>5/15/14</a:t>
+              <a:t>5/22/14</a:t>
             </a:fld>
             <a:endParaRPr lang="en-US"/>
           </a:p>
@@ -2726,7 +2726,7 @@
           <a:p>
             <a:fld id="{8A595817-BE18-6842-A002-ABFC911ED6F4}" type="datetimeFigureOut">
               <a:rPr lang="en-US" smtClean="0"/>
-              <a:t>5/15/14</a:t>
+              <a:t>5/22/14</a:t>
             </a:fld>
             <a:endParaRPr lang="en-US"/>
           </a:p>
@@ -3341,11 +3341,7 @@
           <a:p>
             <a:r>
               <a:rPr lang="en-US" dirty="0" smtClean="0"/>
-              <a:t>V1 FIMS Features Still to be </a:t>
-            </a:r>
-            <a:r>
-              <a:rPr lang="en-US" dirty="0" smtClean="0"/>
-              <a:t>Built</a:t>
+              <a:t>V1 FIMS Features Still to be Built</a:t>
             </a:r>
             <a:endParaRPr lang="en-US" dirty="0"/>
           </a:p>
@@ -3375,22 +3371,13 @@
           <a:p>
             <a:r>
               <a:rPr lang="en-US" dirty="0" smtClean="0"/>
-              <a:t>Configuration File Validation (need to validate the configuration </a:t>
-            </a:r>
+              <a:t>Configuration File Validation (need to validate the configuration file itself)</a:t>
+            </a:r>
+          </a:p>
+          <a:p>
             <a:r>
               <a:rPr lang="en-US" dirty="0" smtClean="0"/>
-              <a:t>file itself)</a:t>
-            </a:r>
-            <a:endParaRPr lang="en-US" dirty="0" smtClean="0"/>
-          </a:p>
-          <a:p>
-            <a:r>
-              <a:rPr lang="en-US" dirty="0" smtClean="0"/>
-              <a:t>Single </a:t>
-            </a:r>
-            <a:r>
-              <a:rPr lang="en-US" dirty="0" smtClean="0"/>
-              <a:t>purpose spreadsheets </a:t>
+              <a:t>Single purpose spreadsheets </a:t>
             </a:r>
           </a:p>
           <a:p>
@@ -3486,16 +3473,7 @@
                 </a:solidFill>
                 <a:latin typeface="ArialMT"/>
               </a:rPr>
-              <a:t>Test </a:t>
-            </a:r>
-            <a:r>
-              <a:rPr lang="en-US" dirty="0" smtClean="0">
-                <a:solidFill>
-                  <a:prstClr val="black"/>
-                </a:solidFill>
-                <a:latin typeface="ArialMT"/>
-              </a:rPr>
-              <a:t>deployment on Jetty (publicly facing server to host software) </a:t>
+              <a:t>Test deployment on Jetty (publicly facing server to host software) </a:t>
             </a:r>
           </a:p>
           <a:p>
@@ -3547,11 +3525,6 @@
               </a:rPr>
               <a:t>Skinning interface</a:t>
             </a:r>
-            <a:endParaRPr lang="en-US" dirty="0">
-              <a:solidFill>
-                <a:prstClr val="black"/>
-              </a:solidFill>
-            </a:endParaRPr>
           </a:p>
           <a:p>
             <a:endParaRPr lang="en-US" dirty="0" smtClean="0"/>
@@ -3623,11 +3596,7 @@
           <a:p>
             <a:r>
               <a:rPr lang="en-US" dirty="0" smtClean="0"/>
-              <a:t>V2 (Lite Option) </a:t>
-            </a:r>
-            <a:r>
-              <a:rPr lang="en-US" dirty="0" smtClean="0"/>
-              <a:t>FIMS Development</a:t>
+              <a:t>V2 (Lite Option) FIMS Development</a:t>
             </a:r>
             <a:endParaRPr lang="en-US" dirty="0"/>
           </a:p>
@@ -3646,7 +3615,7 @@
         <p:spPr/>
         <p:txBody>
           <a:bodyPr>
-            <a:normAutofit fontScale="70000" lnSpcReduction="20000"/>
+            <a:normAutofit fontScale="62500" lnSpcReduction="20000"/>
           </a:bodyPr>
           <a:lstStyle/>
           <a:p>
@@ -3681,8 +3650,26 @@
                 </a:solidFill>
                 <a:latin typeface="+mj-lt"/>
               </a:rPr>
-              <a:t>Fuzzy </a:t>
-            </a:r>
+              <a:t>Fuzzy matching terms in template generator based on synonyms column</a:t>
+            </a:r>
+          </a:p>
+          <a:p>
+            <a:r>
+              <a:rPr lang="en-US" dirty="0" smtClean="0">
+                <a:latin typeface="+mj-lt"/>
+              </a:rPr>
+              <a:t>LDAP integration</a:t>
+            </a:r>
+          </a:p>
+          <a:p>
+            <a:r>
+              <a:rPr lang="en-US" dirty="0" smtClean="0">
+                <a:latin typeface="+mj-lt"/>
+              </a:rPr>
+              <a:t>Store templates by user </a:t>
+            </a:r>
+          </a:p>
+          <a:p>
             <a:r>
               <a:rPr lang="en-US" dirty="0" smtClean="0">
                 <a:solidFill>
@@ -3690,49 +3677,7 @@
                 </a:solidFill>
                 <a:latin typeface="+mj-lt"/>
               </a:rPr>
-              <a:t>matching terms in template generator based on synonyms column</a:t>
-            </a:r>
-          </a:p>
-          <a:p>
-            <a:r>
-              <a:rPr lang="en-US" dirty="0" smtClean="0">
-                <a:latin typeface="+mj-lt"/>
-              </a:rPr>
-              <a:t>LDAP </a:t>
-            </a:r>
-            <a:r>
-              <a:rPr lang="en-US" dirty="0" smtClean="0">
-                <a:latin typeface="+mj-lt"/>
-              </a:rPr>
-              <a:t>integration</a:t>
-            </a:r>
-          </a:p>
-          <a:p>
-            <a:r>
-              <a:rPr lang="en-US" dirty="0" smtClean="0">
-                <a:latin typeface="+mj-lt"/>
-              </a:rPr>
-              <a:t>Store templates by user </a:t>
-            </a:r>
-          </a:p>
-          <a:p>
-            <a:r>
-              <a:rPr lang="en-US" dirty="0" smtClean="0">
-                <a:solidFill>
-                  <a:prstClr val="black"/>
-                </a:solidFill>
-                <a:latin typeface="+mj-lt"/>
-              </a:rPr>
-              <a:t>Better </a:t>
-            </a:r>
-            <a:r>
-              <a:rPr lang="en-US" dirty="0" smtClean="0">
-                <a:solidFill>
-                  <a:prstClr val="black"/>
-                </a:solidFill>
-                <a:latin typeface="+mj-lt"/>
-              </a:rPr>
-              <a:t>Date validation</a:t>
+              <a:t>Better Date validation</a:t>
             </a:r>
           </a:p>
           <a:p>
@@ -3831,8 +3776,31 @@
               <a:rPr lang="en-US" dirty="0" smtClean="0">
                 <a:latin typeface="+mj-lt"/>
               </a:rPr>
-              <a:t>Match photos to spreadsheet using unique IDs (in scope?)</a:t>
-            </a:r>
+              <a:t>Match photos to spreadsheet using unique IDs (in scope?</a:t>
+            </a:r>
+            <a:r>
+              <a:rPr lang="en-US" dirty="0" smtClean="0">
+                <a:latin typeface="+mj-lt"/>
+              </a:rPr>
+              <a:t>)</a:t>
+            </a:r>
+          </a:p>
+          <a:p>
+            <a:r>
+              <a:rPr lang="en-US" dirty="0" smtClean="0">
+                <a:latin typeface="+mj-lt"/>
+              </a:rPr>
+              <a:t>&gt;1000 pick list fields via Service (online validation only, not in spreadsheet– will require </a:t>
+            </a:r>
+            <a:r>
+              <a:rPr lang="en-US" smtClean="0">
+                <a:latin typeface="+mj-lt"/>
+              </a:rPr>
+              <a:t>user authentication)</a:t>
+            </a:r>
+            <a:endParaRPr lang="en-US" dirty="0" smtClean="0">
+              <a:latin typeface="+mj-lt"/>
+            </a:endParaRPr>
           </a:p>
           <a:p>
             <a:endParaRPr lang="en-US" dirty="0">
@@ -4011,7 +3979,15 @@
           <a:p>
             <a:r>
               <a:rPr lang="en-US" dirty="0" smtClean="0"/>
-              <a:t>Etc…. (see list sent to Chris Meyer)</a:t>
+              <a:t>Etc…. </a:t>
+            </a:r>
+            <a:r>
+              <a:rPr lang="en-US" dirty="0" smtClean="0"/>
+              <a:t>(talk to Chris </a:t>
+            </a:r>
+            <a:r>
+              <a:rPr lang="en-US" dirty="0" smtClean="0"/>
+              <a:t>Meyer)</a:t>
             </a:r>
             <a:endParaRPr lang="en-US" dirty="0"/>
           </a:p>

</xml_diff>

<commit_message>
Updated some SI configuration file names
</commit_message>
<xml_diff>
--- a/Documents/Smithsonian/v1Andv2Deliverables.pptx
+++ b/Documents/Smithsonian/v1Andv2Deliverables.pptx
@@ -294,7 +294,7 @@
           <a:p>
             <a:fld id="{8A595817-BE18-6842-A002-ABFC911ED6F4}" type="datetimeFigureOut">
               <a:rPr lang="en-US" smtClean="0"/>
-              <a:t>5/22/14</a:t>
+              <a:t>5/29/14</a:t>
             </a:fld>
             <a:endParaRPr lang="en-US"/>
           </a:p>
@@ -464,7 +464,7 @@
           <a:p>
             <a:fld id="{8A595817-BE18-6842-A002-ABFC911ED6F4}" type="datetimeFigureOut">
               <a:rPr lang="en-US" smtClean="0"/>
-              <a:t>5/22/14</a:t>
+              <a:t>5/29/14</a:t>
             </a:fld>
             <a:endParaRPr lang="en-US"/>
           </a:p>
@@ -644,7 +644,7 @@
           <a:p>
             <a:fld id="{8A595817-BE18-6842-A002-ABFC911ED6F4}" type="datetimeFigureOut">
               <a:rPr lang="en-US" smtClean="0"/>
-              <a:t>5/22/14</a:t>
+              <a:t>5/29/14</a:t>
             </a:fld>
             <a:endParaRPr lang="en-US"/>
           </a:p>
@@ -814,7 +814,7 @@
           <a:p>
             <a:fld id="{8A595817-BE18-6842-A002-ABFC911ED6F4}" type="datetimeFigureOut">
               <a:rPr lang="en-US" smtClean="0"/>
-              <a:t>5/22/14</a:t>
+              <a:t>5/29/14</a:t>
             </a:fld>
             <a:endParaRPr lang="en-US"/>
           </a:p>
@@ -1060,7 +1060,7 @@
           <a:p>
             <a:fld id="{8A595817-BE18-6842-A002-ABFC911ED6F4}" type="datetimeFigureOut">
               <a:rPr lang="en-US" smtClean="0"/>
-              <a:t>5/22/14</a:t>
+              <a:t>5/29/14</a:t>
             </a:fld>
             <a:endParaRPr lang="en-US"/>
           </a:p>
@@ -1348,7 +1348,7 @@
           <a:p>
             <a:fld id="{8A595817-BE18-6842-A002-ABFC911ED6F4}" type="datetimeFigureOut">
               <a:rPr lang="en-US" smtClean="0"/>
-              <a:t>5/22/14</a:t>
+              <a:t>5/29/14</a:t>
             </a:fld>
             <a:endParaRPr lang="en-US"/>
           </a:p>
@@ -1770,7 +1770,7 @@
           <a:p>
             <a:fld id="{8A595817-BE18-6842-A002-ABFC911ED6F4}" type="datetimeFigureOut">
               <a:rPr lang="en-US" smtClean="0"/>
-              <a:t>5/22/14</a:t>
+              <a:t>5/29/14</a:t>
             </a:fld>
             <a:endParaRPr lang="en-US"/>
           </a:p>
@@ -1888,7 +1888,7 @@
           <a:p>
             <a:fld id="{8A595817-BE18-6842-A002-ABFC911ED6F4}" type="datetimeFigureOut">
               <a:rPr lang="en-US" smtClean="0"/>
-              <a:t>5/22/14</a:t>
+              <a:t>5/29/14</a:t>
             </a:fld>
             <a:endParaRPr lang="en-US"/>
           </a:p>
@@ -1983,7 +1983,7 @@
           <a:p>
             <a:fld id="{8A595817-BE18-6842-A002-ABFC911ED6F4}" type="datetimeFigureOut">
               <a:rPr lang="en-US" smtClean="0"/>
-              <a:t>5/22/14</a:t>
+              <a:t>5/29/14</a:t>
             </a:fld>
             <a:endParaRPr lang="en-US"/>
           </a:p>
@@ -2260,7 +2260,7 @@
           <a:p>
             <a:fld id="{8A595817-BE18-6842-A002-ABFC911ED6F4}" type="datetimeFigureOut">
               <a:rPr lang="en-US" smtClean="0"/>
-              <a:t>5/22/14</a:t>
+              <a:t>5/29/14</a:t>
             </a:fld>
             <a:endParaRPr lang="en-US"/>
           </a:p>
@@ -2513,7 +2513,7 @@
           <a:p>
             <a:fld id="{8A595817-BE18-6842-A002-ABFC911ED6F4}" type="datetimeFigureOut">
               <a:rPr lang="en-US" smtClean="0"/>
-              <a:t>5/22/14</a:t>
+              <a:t>5/29/14</a:t>
             </a:fld>
             <a:endParaRPr lang="en-US"/>
           </a:p>
@@ -2726,7 +2726,7 @@
           <a:p>
             <a:fld id="{8A595817-BE18-6842-A002-ABFC911ED6F4}" type="datetimeFigureOut">
               <a:rPr lang="en-US" smtClean="0"/>
-              <a:t>5/22/14</a:t>
+              <a:t>5/29/14</a:t>
             </a:fld>
             <a:endParaRPr lang="en-US"/>
           </a:p>
@@ -3776,13 +3776,7 @@
               <a:rPr lang="en-US" dirty="0" smtClean="0">
                 <a:latin typeface="+mj-lt"/>
               </a:rPr>
-              <a:t>Match photos to spreadsheet using unique IDs (in scope?</a:t>
-            </a:r>
-            <a:r>
-              <a:rPr lang="en-US" dirty="0" smtClean="0">
-                <a:latin typeface="+mj-lt"/>
-              </a:rPr>
-              <a:t>)</a:t>
+              <a:t>Match photos to spreadsheet using unique IDs (in scope?)</a:t>
             </a:r>
           </a:p>
           <a:p>
@@ -3979,15 +3973,7 @@
           <a:p>
             <a:r>
               <a:rPr lang="en-US" dirty="0" smtClean="0"/>
-              <a:t>Etc…. </a:t>
-            </a:r>
-            <a:r>
-              <a:rPr lang="en-US" dirty="0" smtClean="0"/>
-              <a:t>(talk to Chris </a:t>
-            </a:r>
-            <a:r>
-              <a:rPr lang="en-US" dirty="0" smtClean="0"/>
-              <a:t>Meyer)</a:t>
+              <a:t>Etc…. (talk to Chris Meyer)</a:t>
             </a:r>
             <a:endParaRPr lang="en-US" dirty="0"/>
           </a:p>

</xml_diff>